<commit_message>
Use PowerPoint slide sections
</commit_message>
<xml_diff>
--- a/src/examples/title_and_sections/title_and_sections.pptx
+++ b/src/examples/title_and_sections/title_and_sections.pptx
@@ -2,17 +2,35 @@
 <file path=ppt/presentation.xml><?xml version="1.0" encoding="utf-8"?>
 <p:presentation xmlns:p="http://schemas.openxmlformats.org/presentationml/2006/main" showSpecialPlsOnTitleSld="0">
   <p:sldMasterIdLst>
-    <p:sldMasterId xmlns:r="http://schemas.openxmlformats.org/officeDocument/2006/relationships" id="2147483648" r:id="Ra20564193a22459b"/>
+    <p:sldMasterId xmlns:r="http://schemas.openxmlformats.org/officeDocument/2006/relationships" id="2147483648" r:id="R3bc2f3a8fcfc4df3"/>
   </p:sldMasterIdLst>
   <p:sldIdLst>
-    <p:sldId xmlns:r="http://schemas.openxmlformats.org/officeDocument/2006/relationships" id="257" r:id="R26bf25425afe4392"/>
-    <p:sldId xmlns:r="http://schemas.openxmlformats.org/officeDocument/2006/relationships" id="258" r:id="R58c9f8968aa44aee"/>
-    <p:sldId xmlns:r="http://schemas.openxmlformats.org/officeDocument/2006/relationships" id="259" r:id="Re888b8d3863c4a42"/>
-    <p:sldId xmlns:r="http://schemas.openxmlformats.org/officeDocument/2006/relationships" id="260" r:id="R88e5c98591494f82"/>
+    <p:sldId xmlns:r="http://schemas.openxmlformats.org/officeDocument/2006/relationships" id="257" r:id="R270584692c2f4e5c"/>
+    <p:sldId xmlns:r="http://schemas.openxmlformats.org/officeDocument/2006/relationships" id="258" r:id="Rbe3ae2ae780e4778"/>
+    <p:sldId xmlns:r="http://schemas.openxmlformats.org/officeDocument/2006/relationships" id="259" r:id="R622f7c9522864c6c"/>
+    <p:sldId xmlns:r="http://schemas.openxmlformats.org/officeDocument/2006/relationships" id="260" r:id="R4c2fd0c6f42d438d"/>
   </p:sldIdLst>
   <p:sldSz cx="9144000" cy="6858000" type="screen4x3"/>
   <p:notesSz cx="6858000" cy="9144000"/>
   <p:defaultTextStyle/>
+  <p:extLst>
+    <p:ext uri="{521415D9-36F7-43E2-AB2F-B90AF26B5E84}">
+      <p14:sectionLst xmlns:p14="http://schemas.microsoft.com/office/powerpoint/2010/main">
+        <p14:section name="Title slide" id="{F171F34E-282A-429D-9FDB-8EF64896D9A3}">
+          <p14:sldIdLst>
+            <p14:sldId id="257"/>
+          </p14:sldIdLst>
+        </p14:section>
+        <p14:section name="Section title" id="{CF3C8F23-6E26-430C-A9C2-8EA13E52233C}">
+          <p14:sldIdLst>
+            <p14:sldId id="258"/>
+            <p14:sldId id="259"/>
+            <p14:sldId id="260"/>
+          </p14:sldIdLst>
+        </p14:section>
+      </p14:sectionLst>
+    </p:ext>
+  </p:extLst>
 </p:presentation>
 </file>
 
@@ -265,7 +283,7 @@
             </a:lvl1pPr>
           </a:lstStyle>
           <a:p xmlns:a="http://schemas.openxmlformats.org/drawingml/2006/main">
-            <a:fld id="{DAFD18FE-5997-4113-9A2F-EB8A865E015B}" type="slidenum">
+            <a:fld id="{A1E46289-BAC7-4E6A-B2AA-496A78C413ED}" type="slidenum">
               <a:t>‹#›</a:t>
             </a:fld>
           </a:p>
@@ -373,7 +391,7 @@
             </a:lvl1pPr>
           </a:lstStyle>
           <a:p xmlns:a="http://schemas.openxmlformats.org/drawingml/2006/main">
-            <a:fld id="{DAFD18FE-5997-4113-9A2F-EB8A865E015B}" type="slidenum">
+            <a:fld id="{A1E46289-BAC7-4E6A-B2AA-496A78C413ED}" type="slidenum">
               <a:t>‹#›</a:t>
             </a:fld>
           </a:p>
@@ -383,9 +401,9 @@
   </p:cSld>
   <p:clrMap bg1="lt1" tx1="dk1" bg2="lt2" tx2="dk2" accent1="accent1" accent2="accent2" accent3="accent3" accent4="accent4" accent5="accent5" accent6="accent6" hlink="hlink" folHlink="folHlink"/>
   <p:sldLayoutIdLst>
-    <p:sldLayoutId xmlns:r="http://schemas.openxmlformats.org/officeDocument/2006/relationships" id="2147483650" r:id="R96c41e86127940f4"/>
-    <p:sldLayoutId xmlns:r="http://schemas.openxmlformats.org/officeDocument/2006/relationships" id="2147483651" r:id="R5a02fd28326a400c"/>
-    <p:sldLayoutId xmlns:r="http://schemas.openxmlformats.org/officeDocument/2006/relationships" id="2147483652" r:id="R34c9b082f0d14359"/>
+    <p:sldLayoutId xmlns:r="http://schemas.openxmlformats.org/officeDocument/2006/relationships" id="2147483650" r:id="R28de9783f2ca4038"/>
+    <p:sldLayoutId xmlns:r="http://schemas.openxmlformats.org/officeDocument/2006/relationships" id="2147483651" r:id="Rd43d4331d2c24be1"/>
+    <p:sldLayoutId xmlns:r="http://schemas.openxmlformats.org/officeDocument/2006/relationships" id="2147483652" r:id="R9a1097c5d4174ad4"/>
   </p:sldLayoutIdLst>
   <p:txStyles>
     <p:titleStyle>
@@ -773,7 +791,7 @@
             </a:lvl1pPr>
           </a:lstStyle>
           <a:p xmlns:a="http://schemas.openxmlformats.org/drawingml/2006/main">
-            <a:fld id="{DAFD18FE-5997-4113-9A2F-EB8A865E015B}" type="slidenum">
+            <a:fld id="{A1E46289-BAC7-4E6A-B2AA-496A78C413ED}" type="slidenum">
               <a:t>‹#›</a:t>
             </a:fld>
           </a:p>
@@ -830,9 +848,7 @@
         <p:cNvGrpSpPr/>
         <p:nvPr/>
       </p:nvGrpSpPr>
-      <p:grpSpPr>
-        <a:xfrm xmlns:a="http://schemas.openxmlformats.org/drawingml/2006/main"/>
-      </p:grpSpPr>
+      <p:grpSpPr/>
       <p:sp>
         <p:nvSpPr>
           <p:cNvPr id="2" name="Title"/>
@@ -840,12 +856,12 @@
             <a:spLocks xmlns:a="http://schemas.openxmlformats.org/drawingml/2006/main" noGrp="1"/>
           </p:cNvSpPr>
           <p:nvPr>
-            <p:ph type="title"/>
-          </p:nvPr>
-        </p:nvSpPr>
-        <p:spPr>
-          <a:xfrm xmlns:a="http://schemas.openxmlformats.org/drawingml/2006/main">
-            <a:off x="288000" y="288000"/>
+            <p:ph type="ctrTitle"/>
+          </p:nvPr>
+        </p:nvSpPr>
+        <p:spPr>
+          <a:xfrm xmlns:a="http://schemas.openxmlformats.org/drawingml/2006/main">
+            <a:off x="288000" y="3015000"/>
             <a:ext cx="8568000" cy="828000"/>
           </a:xfrm>
         </p:spPr>
@@ -858,48 +874,18 @@
       </p:sp>
       <p:sp>
         <p:nvSpPr>
-          <p:cNvPr id="3" name="Page Numbering"/>
-          <p:cNvSpPr>
-            <a:spLocks xmlns:a="http://schemas.openxmlformats.org/drawingml/2006/main" noGrp="1"/>
-          </p:cNvSpPr>
-          <p:nvPr>
-            <p:ph type="sldNum" idx="12"/>
-          </p:nvPr>
-        </p:nvSpPr>
-        <p:spPr>
-          <a:xfrm xmlns:a="http://schemas.openxmlformats.org/drawingml/2006/main">
-            <a:off x="8568000" y="6282000"/>
-            <a:ext cx="288000" cy="288000"/>
-          </a:xfrm>
-        </p:spPr>
-        <p:txBody>
-          <a:bodyPr xmlns:a="http://schemas.openxmlformats.org/drawingml/2006/main" wrap="none"/>
-          <a:lstStyle xmlns:a="http://schemas.openxmlformats.org/drawingml/2006/main">
-            <a:lvl1pPr algn="r">
-              <a:buNone/>
-            </a:lvl1pPr>
-          </a:lstStyle>
-          <a:p xmlns:a="http://schemas.openxmlformats.org/drawingml/2006/main">
-            <a:fld id="{DAFD18FE-5997-4113-9A2F-EB8A865E015B}" type="slidenum">
-              <a:t>‹#›</a:t>
-            </a:fld>
-          </a:p>
-        </p:txBody>
-      </p:sp>
-      <p:sp>
-        <p:nvSpPr>
-          <p:cNvPr id="4" name="Content"/>
-          <p:cNvSpPr>
-            <a:spLocks xmlns:a="http://schemas.openxmlformats.org/drawingml/2006/main" noGrp="1"/>
-          </p:cNvSpPr>
-          <p:nvPr>
-            <p:ph type="body" idx="1"/>
-          </p:nvPr>
-        </p:nvSpPr>
-        <p:spPr>
-          <a:xfrm xmlns:a="http://schemas.openxmlformats.org/drawingml/2006/main">
-            <a:off x="288000" y="1152000"/>
-            <a:ext cx="8568000" cy="5094000"/>
+          <p:cNvPr id="3" name="Subtitle"/>
+          <p:cNvSpPr>
+            <a:spLocks xmlns:a="http://schemas.openxmlformats.org/drawingml/2006/main" noGrp="1"/>
+          </p:cNvSpPr>
+          <p:nvPr>
+            <p:ph type="subTitle" idx="1"/>
+          </p:nvPr>
+        </p:nvSpPr>
+        <p:spPr>
+          <a:xfrm xmlns:a="http://schemas.openxmlformats.org/drawingml/2006/main">
+            <a:off x="288000" y="3879000"/>
+            <a:ext cx="8568000" cy="828000"/>
           </a:xfrm>
         </p:spPr>
         <p:txBody>

</xml_diff>